<commit_message>
Updated pptx notes to eNNR
</commit_message>
<xml_diff>
--- a/src/eNNR/doc/Aleatoric vs Epistemic.pptx
+++ b/src/eNNR/doc/Aleatoric vs Epistemic.pptx
@@ -3904,17 +3904,24 @@
             </a:r>
           </a:p>
           <a:p>
+            <a:pPr lvl="1"/>
             <a:r>
               <a:rPr lang="en-US" dirty="0"/>
-              <a:t>Does the epistemic variance increase as </a:t>
-            </a:r>
-            <a:r>
-              <a:rPr lang="en-US"/>
-              <a:t>we decrease </a:t>
+              <a:t>These would be extremely useful to screen </a:t>
+            </a:r>
+            <a:r>
+              <a:rPr lang="en-US"/>
+              <a:t>out data </a:t>
             </a:r>
             <a:r>
               <a:rPr lang="en-US" dirty="0"/>
-              <a:t>the sample size?</a:t>
+              <a:t>for which our model is inadequate</a:t>
+            </a:r>
+          </a:p>
+          <a:p>
+            <a:r>
+              <a:rPr lang="en-US" dirty="0"/>
+              <a:t>Does the epistemic variance increase as we decrease the sample size?</a:t>
             </a:r>
           </a:p>
         </p:txBody>

</xml_diff>